<commit_message>
Neue Version mit Meinung
</commit_message>
<xml_diff>
--- a/GIT.pptx
+++ b/GIT.pptx
@@ -355,7 +355,7 @@
           <a:p>
             <a:fld id="{346C9E4B-661A-4012-86D4-6E0B650EA033}" type="datetimeFigureOut">
               <a:rPr lang="de-DE" smtClean="0"/>
-              <a:t>19.01.19</a:t>
+              <a:t>20.01.19</a:t>
             </a:fld>
             <a:endParaRPr lang="de-DE"/>
           </a:p>
@@ -523,7 +523,7 @@
           <a:p>
             <a:fld id="{346C9E4B-661A-4012-86D4-6E0B650EA033}" type="datetimeFigureOut">
               <a:rPr lang="de-DE" smtClean="0"/>
-              <a:t>19.01.19</a:t>
+              <a:t>20.01.19</a:t>
             </a:fld>
             <a:endParaRPr lang="de-DE"/>
           </a:p>
@@ -701,7 +701,7 @@
           <a:p>
             <a:fld id="{346C9E4B-661A-4012-86D4-6E0B650EA033}" type="datetimeFigureOut">
               <a:rPr lang="de-DE" smtClean="0"/>
-              <a:t>19.01.19</a:t>
+              <a:t>20.01.19</a:t>
             </a:fld>
             <a:endParaRPr lang="de-DE"/>
           </a:p>
@@ -869,7 +869,7 @@
           <a:p>
             <a:fld id="{346C9E4B-661A-4012-86D4-6E0B650EA033}" type="datetimeFigureOut">
               <a:rPr lang="de-DE" smtClean="0"/>
-              <a:t>19.01.19</a:t>
+              <a:t>20.01.19</a:t>
             </a:fld>
             <a:endParaRPr lang="de-DE"/>
           </a:p>
@@ -1114,7 +1114,7 @@
           <a:p>
             <a:fld id="{346C9E4B-661A-4012-86D4-6E0B650EA033}" type="datetimeFigureOut">
               <a:rPr lang="de-DE" smtClean="0"/>
-              <a:t>19.01.19</a:t>
+              <a:t>20.01.19</a:t>
             </a:fld>
             <a:endParaRPr lang="de-DE"/>
           </a:p>
@@ -1399,7 +1399,7 @@
           <a:p>
             <a:fld id="{346C9E4B-661A-4012-86D4-6E0B650EA033}" type="datetimeFigureOut">
               <a:rPr lang="de-DE" smtClean="0"/>
-              <a:t>19.01.19</a:t>
+              <a:t>20.01.19</a:t>
             </a:fld>
             <a:endParaRPr lang="de-DE"/>
           </a:p>
@@ -1818,7 +1818,7 @@
           <a:p>
             <a:fld id="{346C9E4B-661A-4012-86D4-6E0B650EA033}" type="datetimeFigureOut">
               <a:rPr lang="de-DE" smtClean="0"/>
-              <a:t>19.01.19</a:t>
+              <a:t>20.01.19</a:t>
             </a:fld>
             <a:endParaRPr lang="de-DE"/>
           </a:p>
@@ -1935,7 +1935,7 @@
           <a:p>
             <a:fld id="{346C9E4B-661A-4012-86D4-6E0B650EA033}" type="datetimeFigureOut">
               <a:rPr lang="de-DE" smtClean="0"/>
-              <a:t>19.01.19</a:t>
+              <a:t>20.01.19</a:t>
             </a:fld>
             <a:endParaRPr lang="de-DE"/>
           </a:p>
@@ -2030,7 +2030,7 @@
           <a:p>
             <a:fld id="{346C9E4B-661A-4012-86D4-6E0B650EA033}" type="datetimeFigureOut">
               <a:rPr lang="de-DE" smtClean="0"/>
-              <a:t>19.01.19</a:t>
+              <a:t>20.01.19</a:t>
             </a:fld>
             <a:endParaRPr lang="de-DE"/>
           </a:p>
@@ -2305,7 +2305,7 @@
           <a:p>
             <a:fld id="{346C9E4B-661A-4012-86D4-6E0B650EA033}" type="datetimeFigureOut">
               <a:rPr lang="de-DE" smtClean="0"/>
-              <a:t>19.01.19</a:t>
+              <a:t>20.01.19</a:t>
             </a:fld>
             <a:endParaRPr lang="de-DE"/>
           </a:p>
@@ -2557,7 +2557,7 @@
           <a:p>
             <a:fld id="{346C9E4B-661A-4012-86D4-6E0B650EA033}" type="datetimeFigureOut">
               <a:rPr lang="de-DE" smtClean="0"/>
-              <a:t>19.01.19</a:t>
+              <a:t>20.01.19</a:t>
             </a:fld>
             <a:endParaRPr lang="de-DE"/>
           </a:p>
@@ -2768,7 +2768,7 @@
           <a:p>
             <a:fld id="{346C9E4B-661A-4012-86D4-6E0B650EA033}" type="datetimeFigureOut">
               <a:rPr lang="de-DE" smtClean="0"/>
-              <a:t>19.01.19</a:t>
+              <a:t>20.01.19</a:t>
             </a:fld>
             <a:endParaRPr lang="de-DE"/>
           </a:p>
@@ -13409,15 +13409,7 @@
             </a:pPr>
             <a:r>
               <a:rPr lang="en" dirty="0"/>
-              <a:t>Now that they </a:t>
-            </a:r>
-            <a:r>
-              <a:rPr lang="en"/>
-              <a:t>use GIT </a:t>
-            </a:r>
-            <a:r>
-              <a:rPr lang="en" dirty="0"/>
-              <a:t>they spend so much more time in source control than ever before.</a:t>
+              <a:t>Now that they use GIT they spend so much more time in source control than ever before.</a:t>
             </a:r>
           </a:p>
           <a:p>

</xml_diff>